<commit_message>
Update nano sources to match pre-6.2 images
</commit_message>
<xml_diff>
--- a/images/behave-elaborate.pptx
+++ b/images/behave-elaborate.pptx
@@ -283,7 +283,7 @@
               <a:pPr>
                 <a:defRPr/>
               </a:pPr>
-              <a:t>8/24/23</a:t>
+              <a:t>11/18/2021</a:t>
             </a:fld>
             <a:endParaRPr lang="en-US" dirty="0"/>
           </a:p>
@@ -506,7 +506,7 @@
               <a:pPr>
                 <a:defRPr/>
               </a:pPr>
-              <a:t>8/24/23</a:t>
+              <a:t>11/18/2021</a:t>
             </a:fld>
             <a:endParaRPr lang="en-US" dirty="0"/>
           </a:p>
@@ -930,7 +930,7 @@
               </a14:hiddenLine>
             </a:ext>
             <a:ext uri="{FAA26D3D-D897-4be2-8F04-BA451C77F1D7}">
-              <ma14:placeholderFlag xmlns:ma14="http://schemas.microsoft.com/office/mac/drawingml/2011/main" xmlns="" val="1"/>
+              <ma14:placeholderFlag xmlns="" xmlns:ma14="http://schemas.microsoft.com/office/mac/drawingml/2011/main" val="1"/>
             </a:ext>
           </a:extLst>
         </p:spPr>
@@ -1604,9 +1604,9 @@
         <p:grpSpPr>
           <a:xfrm>
             <a:off x="852164" y="589526"/>
-            <a:ext cx="7506975" cy="4211074"/>
+            <a:ext cx="7506975" cy="3466659"/>
             <a:chOff x="852164" y="589526"/>
-            <a:chExt cx="7506975" cy="4211074"/>
+            <a:chExt cx="7506975" cy="3466659"/>
           </a:xfrm>
         </p:grpSpPr>
         <p:sp>
@@ -1624,7 +1624,7 @@
           <p:spPr>
             <a:xfrm>
               <a:off x="852164" y="589526"/>
-              <a:ext cx="7506975" cy="4211074"/>
+              <a:ext cx="7506975" cy="3466659"/>
             </a:xfrm>
             <a:prstGeom prst="rect">
               <a:avLst/>
@@ -1746,7 +1746,7 @@
           </p:nvSpPr>
           <p:spPr>
             <a:xfrm>
-              <a:off x="4571999" y="2075471"/>
+              <a:off x="4571999" y="1322192"/>
               <a:ext cx="3576851" cy="545768"/>
             </a:xfrm>
             <a:prstGeom prst="rect">
@@ -1850,7 +1850,7 @@
           </p:nvSpPr>
           <p:spPr>
             <a:xfrm>
-              <a:off x="4571999" y="2730919"/>
+              <a:off x="4571999" y="1977640"/>
               <a:ext cx="3576852" cy="545768"/>
             </a:xfrm>
             <a:prstGeom prst="rect">
@@ -1981,7 +1981,7 @@
           </p:nvSpPr>
           <p:spPr>
             <a:xfrm>
-              <a:off x="4571999" y="3386367"/>
+              <a:off x="4571999" y="2633088"/>
               <a:ext cx="3576853" cy="545768"/>
             </a:xfrm>
             <a:prstGeom prst="rect">
@@ -2112,7 +2112,7 @@
           </p:nvSpPr>
           <p:spPr>
             <a:xfrm>
-              <a:off x="4571999" y="4041816"/>
+              <a:off x="4571999" y="3288537"/>
               <a:ext cx="3576853" cy="545768"/>
             </a:xfrm>
             <a:prstGeom prst="rect">
@@ -2235,8 +2235,8 @@
           </p:nvSpPr>
           <p:spPr>
             <a:xfrm>
-              <a:off x="2207009" y="1322191"/>
-              <a:ext cx="2698713" cy="545768"/>
+              <a:off x="2207010" y="1322191"/>
+              <a:ext cx="1632516" cy="545768"/>
             </a:xfrm>
             <a:prstGeom prst="rect">
               <a:avLst/>
@@ -2279,7 +2279,7 @@
                   <a:latin typeface="Courier New" panose="02070309020205020404" pitchFamily="49" charset="0"/>
                   <a:cs typeface="Courier New" panose="02070309020205020404" pitchFamily="49" charset="0"/>
                 </a:rPr>
-                <a:t>plan-component base-config</a:t>
+                <a:t>plan-component self</a:t>
               </a:r>
             </a:p>
             <a:p>
@@ -2316,21 +2316,6 @@
                   <a:cs typeface="Courier New" panose="02070309020205020404" pitchFamily="49" charset="0"/>
                   <a:sym typeface="Wingdings" panose="05000000000000000000" pitchFamily="2" charset="2"/>
                 </a:rPr>
-                <a:t> </a:t>
-              </a:r>
-              <a:r>
-                <a:rPr lang="en-US" sz="1000" dirty="0">
-                  <a:latin typeface="Courier New" panose="02070309020205020404" pitchFamily="49" charset="0"/>
-                  <a:cs typeface="Courier New" panose="02070309020205020404" pitchFamily="49" charset="0"/>
-                </a:rPr>
-                <a:t>configured </a:t>
-              </a:r>
-              <a:r>
-                <a:rPr lang="en-US" sz="1000" dirty="0">
-                  <a:latin typeface="Courier New" panose="02070309020205020404" pitchFamily="49" charset="0"/>
-                  <a:cs typeface="Courier New" panose="02070309020205020404" pitchFamily="49" charset="0"/>
-                  <a:sym typeface="Wingdings" panose="05000000000000000000" pitchFamily="2" charset="2"/>
-                </a:rPr>
                 <a:t> ready</a:t>
               </a:r>
               <a:endParaRPr lang="en-SI" sz="1000" dirty="0">
@@ -2354,7 +2339,7 @@
           </p:nvSpPr>
           <p:spPr>
             <a:xfrm>
-              <a:off x="2207010" y="3003803"/>
+              <a:off x="2207010" y="2250524"/>
               <a:ext cx="1321636" cy="655448"/>
             </a:xfrm>
             <a:prstGeom prst="rect">
@@ -2505,7 +2490,7 @@
           </p:nvCxnSpPr>
           <p:spPr>
             <a:xfrm flipV="1">
-              <a:off x="3528646" y="2348355"/>
+              <a:off x="3528646" y="1595076"/>
               <a:ext cx="1043353" cy="983172"/>
             </a:xfrm>
             <a:prstGeom prst="bentConnector3">
@@ -2551,7 +2536,7 @@
           </p:nvCxnSpPr>
           <p:spPr>
             <a:xfrm flipV="1">
-              <a:off x="3528646" y="3003803"/>
+              <a:off x="3528646" y="2250524"/>
               <a:ext cx="1043353" cy="327724"/>
             </a:xfrm>
             <a:prstGeom prst="bentConnector3">
@@ -2597,7 +2582,7 @@
           </p:nvCxnSpPr>
           <p:spPr>
             <a:xfrm>
-              <a:off x="3528646" y="3331527"/>
+              <a:off x="3528646" y="2578248"/>
               <a:ext cx="1043353" cy="327724"/>
             </a:xfrm>
             <a:prstGeom prst="bentConnector3">
@@ -2643,7 +2628,7 @@
           </p:nvCxnSpPr>
           <p:spPr>
             <a:xfrm>
-              <a:off x="3528646" y="3331527"/>
+              <a:off x="3528646" y="2578248"/>
               <a:ext cx="1043353" cy="983173"/>
             </a:xfrm>
             <a:prstGeom prst="bentConnector3">
@@ -2681,7 +2666,6 @@
               </a:extLst>
             </p:cNvPr>
             <p:cNvCxnSpPr>
-              <a:cxnSpLocks/>
               <a:endCxn id="8" idx="1"/>
             </p:cNvCxnSpPr>
             <p:nvPr/>
@@ -2689,7 +2673,7 @@
           <p:spPr>
             <a:xfrm flipV="1">
               <a:off x="1877716" y="1595075"/>
-              <a:ext cx="329293" cy="1"/>
+              <a:ext cx="329294" cy="1"/>
             </a:xfrm>
             <a:prstGeom prst="straightConnector1">
               <a:avLst/>
@@ -2734,8 +2718,8 @@
           </p:nvCxnSpPr>
           <p:spPr>
             <a:xfrm rot="16200000" flipH="1">
-              <a:off x="1045519" y="2170036"/>
-              <a:ext cx="1538360" cy="784621"/>
+              <a:off x="1422159" y="1793396"/>
+              <a:ext cx="785081" cy="784621"/>
             </a:xfrm>
             <a:prstGeom prst="bentConnector2">
               <a:avLst/>
@@ -3704,23 +3688,6 @@
 </file>
 
 <file path=customXml/item1.xml><?xml version="1.0" encoding="utf-8"?>
-<p:properties xmlns:p="http://schemas.microsoft.com/office/2006/metadata/properties" xmlns:xsi="http://www.w3.org/2001/XMLSchema-instance" xmlns:pc="http://schemas.microsoft.com/office/infopath/2007/PartnerControls">
-  <documentManagement>
-    <x0h2 xmlns="34968e7b-9d4e-4a89-8768-2a6d2a4b1992" xsi:nil="true"/>
-  </documentManagement>
-</p:properties>
-</file>
-
-<file path=customXml/item2.xml><?xml version="1.0" encoding="utf-8"?>
-<?mso-contentType ?>
-<FormTemplates xmlns="http://schemas.microsoft.com/sharepoint/v3/contenttype/forms">
-  <Display>DocumentLibraryForm</Display>
-  <Edit>DocumentLibraryForm</Edit>
-  <New>DocumentLibraryForm</New>
-</FormTemplates>
-</file>
-
-<file path=customXml/item3.xml><?xml version="1.0" encoding="utf-8"?>
 <ct:contentTypeSchema xmlns:ct="http://schemas.microsoft.com/office/2006/metadata/contentType" xmlns:ma="http://schemas.microsoft.com/office/2006/metadata/properties/metaAttributes" ct:_="" ma:_="" ma:contentTypeName="Document" ma:contentTypeID="0x01010065A1BAB3F0E3AE4B89D7529244B468AD" ma:contentTypeVersion="12" ma:contentTypeDescription="Create a new document." ma:contentTypeScope="" ma:versionID="e09e7bb66b72f1a88936044f6fa81ee5">
   <xsd:schema xmlns:xsd="http://www.w3.org/2001/XMLSchema" xmlns:xs="http://www.w3.org/2001/XMLSchema" xmlns:p="http://schemas.microsoft.com/office/2006/metadata/properties" xmlns:ns2="34968e7b-9d4e-4a89-8768-2a6d2a4b1992" xmlns:ns3="1f94f914-f638-4817-9525-03fcae7a639e" targetNamespace="http://schemas.microsoft.com/office/2006/metadata/properties" ma:root="true" ma:fieldsID="45c1bad7a87e1818c5cdb44ac099ab40" ns2:_="" ns3:_="">
     <xsd:import namespace="34968e7b-9d4e-4a89-8768-2a6d2a4b1992"/>
@@ -3937,32 +3904,24 @@
 </ct:contentTypeSchema>
 </file>
 
-<file path=customXml/itemProps1.xml><?xml version="1.0" encoding="utf-8"?>
-<ds:datastoreItem xmlns:ds="http://schemas.openxmlformats.org/officeDocument/2006/customXml" ds:itemID="{B3D56160-6CAC-411B-BC9E-725DD541A968}">
-  <ds:schemaRefs>
-    <ds:schemaRef ds:uri="http://purl.org/dc/dcmitype/"/>
-    <ds:schemaRef ds:uri="34968e7b-9d4e-4a89-8768-2a6d2a4b1992"/>
-    <ds:schemaRef ds:uri="1f94f914-f638-4817-9525-03fcae7a639e"/>
-    <ds:schemaRef ds:uri="http://www.w3.org/XML/1998/namespace"/>
-    <ds:schemaRef ds:uri="http://purl.org/dc/elements/1.1/"/>
-    <ds:schemaRef ds:uri="http://schemas.microsoft.com/office/2006/documentManagement/types"/>
-    <ds:schemaRef ds:uri="http://purl.org/dc/terms/"/>
-    <ds:schemaRef ds:uri="http://schemas.microsoft.com/office/infopath/2007/PartnerControls"/>
-    <ds:schemaRef ds:uri="http://schemas.openxmlformats.org/package/2006/metadata/core-properties"/>
-    <ds:schemaRef ds:uri="http://schemas.microsoft.com/office/2006/metadata/properties"/>
-  </ds:schemaRefs>
-</ds:datastoreItem>
+<file path=customXml/item2.xml><?xml version="1.0" encoding="utf-8"?>
+<?mso-contentType ?>
+<FormTemplates xmlns="http://schemas.microsoft.com/sharepoint/v3/contenttype/forms">
+  <Display>DocumentLibraryForm</Display>
+  <Edit>DocumentLibraryForm</Edit>
+  <New>DocumentLibraryForm</New>
+</FormTemplates>
 </file>
 
-<file path=customXml/itemProps2.xml><?xml version="1.0" encoding="utf-8"?>
-<ds:datastoreItem xmlns:ds="http://schemas.openxmlformats.org/officeDocument/2006/customXml" ds:itemID="{7DE97B48-5A2B-4B7A-A549-0A8718B50E56}">
-  <ds:schemaRefs>
-    <ds:schemaRef ds:uri="http://schemas.microsoft.com/sharepoint/v3/contenttype/forms"/>
-  </ds:schemaRefs>
-</ds:datastoreItem>
+<file path=customXml/item3.xml><?xml version="1.0" encoding="utf-8"?>
+<p:properties xmlns:p="http://schemas.microsoft.com/office/2006/metadata/properties" xmlns:xsi="http://www.w3.org/2001/XMLSchema-instance" xmlns:pc="http://schemas.microsoft.com/office/infopath/2007/PartnerControls">
+  <documentManagement>
+    <x0h2 xmlns="34968e7b-9d4e-4a89-8768-2a6d2a4b1992" xsi:nil="true"/>
+  </documentManagement>
+</p:properties>
 </file>
 
-<file path=customXml/itemProps3.xml><?xml version="1.0" encoding="utf-8"?>
+<file path=customXml/itemProps1.xml><?xml version="1.0" encoding="utf-8"?>
 <ds:datastoreItem xmlns:ds="http://schemas.openxmlformats.org/officeDocument/2006/customXml" ds:itemID="{20884EB5-7697-43A0-AD21-C147D1530140}">
   <ds:schemaRefs>
     <ds:schemaRef ds:uri="http://schemas.microsoft.com/office/2006/metadata/contentType"/>
@@ -3979,4 +3938,29 @@
     <ds:schemaRef ds:uri="http://schemas.microsoft.com/internal/obd"/>
   </ds:schemaRefs>
 </ds:datastoreItem>
+</file>
+
+<file path=customXml/itemProps2.xml><?xml version="1.0" encoding="utf-8"?>
+<ds:datastoreItem xmlns:ds="http://schemas.openxmlformats.org/officeDocument/2006/customXml" ds:itemID="{7DE97B48-5A2B-4B7A-A549-0A8718B50E56}">
+  <ds:schemaRefs>
+    <ds:schemaRef ds:uri="http://schemas.microsoft.com/sharepoint/v3/contenttype/forms"/>
+  </ds:schemaRefs>
+</ds:datastoreItem>
+</file>
+
+<file path=customXml/itemProps3.xml><?xml version="1.0" encoding="utf-8"?>
+<ds:datastoreItem xmlns:ds="http://schemas.openxmlformats.org/officeDocument/2006/customXml" ds:itemID="{B3D56160-6CAC-411B-BC9E-725DD541A968}">
+  <ds:schemaRefs>
+    <ds:schemaRef ds:uri="http://purl.org/dc/dcmitype/"/>
+    <ds:schemaRef ds:uri="34968e7b-9d4e-4a89-8768-2a6d2a4b1992"/>
+    <ds:schemaRef ds:uri="1f94f914-f638-4817-9525-03fcae7a639e"/>
+    <ds:schemaRef ds:uri="http://www.w3.org/XML/1998/namespace"/>
+    <ds:schemaRef ds:uri="http://purl.org/dc/elements/1.1/"/>
+    <ds:schemaRef ds:uri="http://schemas.microsoft.com/office/2006/documentManagement/types"/>
+    <ds:schemaRef ds:uri="http://purl.org/dc/terms/"/>
+    <ds:schemaRef ds:uri="http://schemas.microsoft.com/office/infopath/2007/PartnerControls"/>
+    <ds:schemaRef ds:uri="http://schemas.openxmlformats.org/package/2006/metadata/core-properties"/>
+    <ds:schemaRef ds:uri="http://schemas.microsoft.com/office/2006/metadata/properties"/>
+  </ds:schemaRefs>
+</ds:datastoreItem>
 </file>
</xml_diff>